<commit_message>
add parallel library documents
</commit_message>
<xml_diff>
--- a/Parallel.pptx
+++ b/Parallel.pptx
@@ -4639,6 +4639,405 @@
           <a:chExt cx="0" cy="0"/>
         </a:xfrm>
       </p:grpSpPr>
+      <p:grpSp>
+        <p:nvGrpSpPr>
+          <p:cNvPr id="13" name="组合 12"/>
+          <p:cNvGrpSpPr/>
+          <p:nvPr/>
+        </p:nvGrpSpPr>
+        <p:grpSpPr>
+          <a:xfrm>
+            <a:off x="1315616" y="751114"/>
+            <a:ext cx="7976507" cy="5005874"/>
+            <a:chOff x="522514" y="545841"/>
+            <a:chExt cx="7976507" cy="5005874"/>
+          </a:xfrm>
+        </p:grpSpPr>
+        <p:sp>
+          <p:nvSpPr>
+            <p:cNvPr id="12" name="下箭头 11"/>
+            <p:cNvSpPr/>
+            <p:nvPr/>
+          </p:nvSpPr>
+          <p:spPr>
+            <a:xfrm>
+              <a:off x="3200400" y="2174033"/>
+              <a:ext cx="2649894" cy="2099387"/>
+            </a:xfrm>
+            <a:prstGeom prst="downArrow">
+              <a:avLst>
+                <a:gd name="adj1" fmla="val 50000"/>
+                <a:gd name="adj2" fmla="val 37111"/>
+              </a:avLst>
+            </a:prstGeom>
+          </p:spPr>
+          <p:style>
+            <a:lnRef idx="0">
+              <a:schemeClr val="accent3"/>
+            </a:lnRef>
+            <a:fillRef idx="3">
+              <a:schemeClr val="accent3"/>
+            </a:fillRef>
+            <a:effectRef idx="3">
+              <a:schemeClr val="accent3"/>
+            </a:effectRef>
+            <a:fontRef idx="minor">
+              <a:schemeClr val="lt1"/>
+            </a:fontRef>
+          </p:style>
+          <p:txBody>
+            <a:bodyPr rtlCol="0" anchor="ctr"/>
+            <a:lstStyle/>
+            <a:p>
+              <a:pPr algn="ctr"/>
+              <a:endParaRPr lang="zh-CN" altLang="en-US"/>
+            </a:p>
+          </p:txBody>
+        </p:sp>
+        <p:sp>
+          <p:nvSpPr>
+            <p:cNvPr id="10" name="矩形 9"/>
+            <p:cNvSpPr/>
+            <p:nvPr/>
+          </p:nvSpPr>
+          <p:spPr>
+            <a:xfrm>
+              <a:off x="5365102" y="545841"/>
+              <a:ext cx="2957804" cy="1450910"/>
+            </a:xfrm>
+            <a:prstGeom prst="rect">
+              <a:avLst/>
+            </a:prstGeom>
+            <a:noFill/>
+            <a:ln w="63500">
+              <a:prstDash val="sysDash"/>
+            </a:ln>
+          </p:spPr>
+          <p:style>
+            <a:lnRef idx="2">
+              <a:schemeClr val="accent1">
+                <a:shade val="50000"/>
+              </a:schemeClr>
+            </a:lnRef>
+            <a:fillRef idx="1">
+              <a:schemeClr val="accent1"/>
+            </a:fillRef>
+            <a:effectRef idx="0">
+              <a:schemeClr val="accent1"/>
+            </a:effectRef>
+            <a:fontRef idx="minor">
+              <a:schemeClr val="lt1"/>
+            </a:fontRef>
+          </p:style>
+          <p:txBody>
+            <a:bodyPr rtlCol="0" anchor="ctr"/>
+            <a:lstStyle/>
+            <a:p>
+              <a:pPr algn="ctr"/>
+              <a:endParaRPr lang="zh-CN" altLang="en-US"/>
+            </a:p>
+          </p:txBody>
+        </p:sp>
+        <p:sp>
+          <p:nvSpPr>
+            <p:cNvPr id="2" name="矩形 1"/>
+            <p:cNvSpPr/>
+            <p:nvPr/>
+          </p:nvSpPr>
+          <p:spPr>
+            <a:xfrm>
+              <a:off x="1698171" y="2346649"/>
+              <a:ext cx="5878286" cy="895738"/>
+            </a:xfrm>
+            <a:prstGeom prst="rect">
+              <a:avLst/>
+            </a:prstGeom>
+          </p:spPr>
+          <p:style>
+            <a:lnRef idx="0">
+              <a:schemeClr val="accent2"/>
+            </a:lnRef>
+            <a:fillRef idx="3">
+              <a:schemeClr val="accent2"/>
+            </a:fillRef>
+            <a:effectRef idx="3">
+              <a:schemeClr val="accent2"/>
+            </a:effectRef>
+            <a:fontRef idx="minor">
+              <a:schemeClr val="lt1"/>
+            </a:fontRef>
+          </p:style>
+          <p:txBody>
+            <a:bodyPr rtlCol="0" anchor="ctr"/>
+            <a:lstStyle/>
+            <a:p>
+              <a:pPr algn="ctr"/>
+              <a:r>
+                <a:rPr lang="en-US" altLang="zh-CN" dirty="0" err="1" smtClean="0"/>
+                <a:t>Microsoft.VisualBasic.ComputingServices</a:t>
+              </a:r>
+              <a:r>
+                <a:rPr lang="en-US" altLang="zh-CN" dirty="0" smtClean="0"/>
+                <a:t>    </a:t>
+              </a:r>
+            </a:p>
+            <a:p>
+              <a:pPr algn="ctr"/>
+              <a:r>
+                <a:rPr lang="en-US" altLang="zh-CN" dirty="0" smtClean="0"/>
+                <a:t>Parallel Library</a:t>
+              </a:r>
+            </a:p>
+          </p:txBody>
+        </p:sp>
+        <p:sp>
+          <p:nvSpPr>
+            <p:cNvPr id="3" name="矩形 2"/>
+            <p:cNvSpPr/>
+            <p:nvPr/>
+          </p:nvSpPr>
+          <p:spPr>
+            <a:xfrm>
+              <a:off x="522514" y="550506"/>
+              <a:ext cx="1847462" cy="1446245"/>
+            </a:xfrm>
+            <a:prstGeom prst="rect">
+              <a:avLst/>
+            </a:prstGeom>
+          </p:spPr>
+          <p:style>
+            <a:lnRef idx="0">
+              <a:schemeClr val="accent2"/>
+            </a:lnRef>
+            <a:fillRef idx="3">
+              <a:schemeClr val="accent2"/>
+            </a:fillRef>
+            <a:effectRef idx="3">
+              <a:schemeClr val="accent2"/>
+            </a:effectRef>
+            <a:fontRef idx="minor">
+              <a:schemeClr val="lt1"/>
+            </a:fontRef>
+          </p:style>
+          <p:txBody>
+            <a:bodyPr rtlCol="0" anchor="ctr"/>
+            <a:lstStyle/>
+            <a:p>
+              <a:pPr algn="ctr"/>
+              <a:r>
+                <a:rPr lang="en-US" altLang="zh-CN" dirty="0" smtClean="0"/>
+                <a:t>Windows Phone/UWP Program</a:t>
+              </a:r>
+              <a:endParaRPr lang="zh-CN" altLang="en-US" dirty="0"/>
+            </a:p>
+          </p:txBody>
+        </p:sp>
+        <p:sp>
+          <p:nvSpPr>
+            <p:cNvPr id="6" name="剪去单角的矩形 5"/>
+            <p:cNvSpPr/>
+            <p:nvPr/>
+          </p:nvSpPr>
+          <p:spPr>
+            <a:xfrm>
+              <a:off x="1698170" y="4488024"/>
+              <a:ext cx="2724539" cy="1063690"/>
+            </a:xfrm>
+            <a:prstGeom prst="snip1Rect">
+              <a:avLst/>
+            </a:prstGeom>
+          </p:spPr>
+          <p:style>
+            <a:lnRef idx="0">
+              <a:schemeClr val="accent3"/>
+            </a:lnRef>
+            <a:fillRef idx="3">
+              <a:schemeClr val="accent3"/>
+            </a:fillRef>
+            <a:effectRef idx="3">
+              <a:schemeClr val="accent3"/>
+            </a:effectRef>
+            <a:fontRef idx="minor">
+              <a:schemeClr val="lt1"/>
+            </a:fontRef>
+          </p:style>
+          <p:txBody>
+            <a:bodyPr rtlCol="0" anchor="ctr"/>
+            <a:lstStyle/>
+            <a:p>
+              <a:pPr algn="ctr"/>
+              <a:r>
+                <a:rPr lang="en-US" altLang="zh-CN" dirty="0" smtClean="0"/>
+                <a:t>Microsoft Azure Cloud</a:t>
+              </a:r>
+              <a:endParaRPr lang="zh-CN" altLang="en-US" dirty="0"/>
+            </a:p>
+          </p:txBody>
+        </p:sp>
+        <p:sp>
+          <p:nvSpPr>
+            <p:cNvPr id="7" name="矩形 6"/>
+            <p:cNvSpPr/>
+            <p:nvPr/>
+          </p:nvSpPr>
+          <p:spPr>
+            <a:xfrm>
+              <a:off x="4870580" y="4488025"/>
+              <a:ext cx="2705877" cy="1063690"/>
+            </a:xfrm>
+            <a:prstGeom prst="rect">
+              <a:avLst/>
+            </a:prstGeom>
+          </p:spPr>
+          <p:style>
+            <a:lnRef idx="0">
+              <a:schemeClr val="accent4"/>
+            </a:lnRef>
+            <a:fillRef idx="3">
+              <a:schemeClr val="accent4"/>
+            </a:fillRef>
+            <a:effectRef idx="3">
+              <a:schemeClr val="accent4"/>
+            </a:effectRef>
+            <a:fontRef idx="minor">
+              <a:schemeClr val="lt1"/>
+            </a:fontRef>
+          </p:style>
+          <p:txBody>
+            <a:bodyPr rtlCol="0" anchor="ctr"/>
+            <a:lstStyle/>
+            <a:p>
+              <a:pPr algn="ctr"/>
+              <a:r>
+                <a:rPr lang="en-US" altLang="zh-CN" dirty="0" smtClean="0"/>
+                <a:t>Cloud Computing on Your own server cluster</a:t>
+              </a:r>
+              <a:endParaRPr lang="zh-CN" altLang="en-US" dirty="0"/>
+            </a:p>
+          </p:txBody>
+        </p:sp>
+        <p:sp>
+          <p:nvSpPr>
+            <p:cNvPr id="8" name="矩形 7"/>
+            <p:cNvSpPr/>
+            <p:nvPr/>
+          </p:nvSpPr>
+          <p:spPr>
+            <a:xfrm>
+              <a:off x="5568042" y="641479"/>
+              <a:ext cx="2446954" cy="830425"/>
+            </a:xfrm>
+            <a:prstGeom prst="rect">
+              <a:avLst/>
+            </a:prstGeom>
+          </p:spPr>
+          <p:style>
+            <a:lnRef idx="0">
+              <a:schemeClr val="accent1"/>
+            </a:lnRef>
+            <a:fillRef idx="3">
+              <a:schemeClr val="accent1"/>
+            </a:fillRef>
+            <a:effectRef idx="3">
+              <a:schemeClr val="accent1"/>
+            </a:effectRef>
+            <a:fontRef idx="minor">
+              <a:schemeClr val="lt1"/>
+            </a:fontRef>
+          </p:style>
+          <p:txBody>
+            <a:bodyPr rtlCol="0" anchor="ctr"/>
+            <a:lstStyle/>
+            <a:p>
+              <a:pPr algn="ctr"/>
+              <a:r>
+                <a:rPr lang="en-US" altLang="zh-CN" dirty="0" smtClean="0"/>
+                <a:t>Linux/Mac Program</a:t>
+              </a:r>
+              <a:endParaRPr lang="zh-CN" altLang="en-US" dirty="0"/>
+            </a:p>
+          </p:txBody>
+        </p:sp>
+        <p:sp>
+          <p:nvSpPr>
+            <p:cNvPr id="9" name="矩形 8"/>
+            <p:cNvSpPr/>
+            <p:nvPr/>
+          </p:nvSpPr>
+          <p:spPr>
+            <a:xfrm>
+              <a:off x="2646006" y="550505"/>
+              <a:ext cx="2005304" cy="1446246"/>
+            </a:xfrm>
+            <a:prstGeom prst="rect">
+              <a:avLst/>
+            </a:prstGeom>
+          </p:spPr>
+          <p:style>
+            <a:lnRef idx="0">
+              <a:schemeClr val="accent4"/>
+            </a:lnRef>
+            <a:fillRef idx="3">
+              <a:schemeClr val="accent4"/>
+            </a:fillRef>
+            <a:effectRef idx="3">
+              <a:schemeClr val="accent4"/>
+            </a:effectRef>
+            <a:fontRef idx="minor">
+              <a:schemeClr val="lt1"/>
+            </a:fontRef>
+          </p:style>
+          <p:txBody>
+            <a:bodyPr rtlCol="0" anchor="ctr"/>
+            <a:lstStyle/>
+            <a:p>
+              <a:pPr algn="ctr"/>
+              <a:r>
+                <a:rPr lang="en-US" altLang="zh-CN" dirty="0" smtClean="0"/>
+                <a:t>VisualBasic/C# Win32 </a:t>
+              </a:r>
+            </a:p>
+            <a:p>
+              <a:pPr algn="ctr"/>
+              <a:r>
+                <a:rPr lang="en-US" altLang="zh-CN" dirty="0" smtClean="0"/>
+                <a:t>Program</a:t>
+              </a:r>
+              <a:endParaRPr lang="zh-CN" altLang="en-US" dirty="0"/>
+            </a:p>
+          </p:txBody>
+        </p:sp>
+        <p:sp>
+          <p:nvSpPr>
+            <p:cNvPr id="11" name="文本框 10"/>
+            <p:cNvSpPr txBox="1"/>
+            <p:nvPr/>
+          </p:nvSpPr>
+          <p:spPr>
+            <a:xfrm>
+              <a:off x="5494564" y="1567542"/>
+              <a:ext cx="3004457" cy="369332"/>
+            </a:xfrm>
+            <a:prstGeom prst="rect">
+              <a:avLst/>
+            </a:prstGeom>
+            <a:noFill/>
+          </p:spPr>
+          <p:txBody>
+            <a:bodyPr wrap="square" rtlCol="0">
+              <a:spAutoFit/>
+            </a:bodyPr>
+            <a:lstStyle/>
+            <a:p>
+              <a:r>
+                <a:rPr lang="en-US" altLang="zh-CN" dirty="0" smtClean="0"/>
+                <a:t>Latest Mono Environment</a:t>
+              </a:r>
+              <a:endParaRPr lang="zh-CN" altLang="en-US" dirty="0"/>
+            </a:p>
+          </p:txBody>
+        </p:sp>
+      </p:grpSp>
     </p:spTree>
     <p:extLst>
       <p:ext uri="{BB962C8B-B14F-4D97-AF65-F5344CB8AC3E}">

</xml_diff>

<commit_message>
bugs fixed on the returns value null object
</commit_message>
<xml_diff>
--- a/Parallel.pptx
+++ b/Parallel.pptx
@@ -245,7 +245,7 @@
           <a:p>
             <a:fld id="{D997B5FA-0921-464F-AAE1-844C04324D75}" type="datetimeFigureOut">
               <a:rPr lang="zh-CN" altLang="en-US" smtClean="0"/>
-              <a:t>2016/2/2</a:t>
+              <a:t>2016/2/3</a:t>
             </a:fld>
             <a:endParaRPr lang="zh-CN" altLang="en-US"/>
           </a:p>
@@ -415,7 +415,7 @@
           <a:p>
             <a:fld id="{D997B5FA-0921-464F-AAE1-844C04324D75}" type="datetimeFigureOut">
               <a:rPr lang="zh-CN" altLang="en-US" smtClean="0"/>
-              <a:t>2016/2/2</a:t>
+              <a:t>2016/2/3</a:t>
             </a:fld>
             <a:endParaRPr lang="zh-CN" altLang="en-US"/>
           </a:p>
@@ -595,7 +595,7 @@
           <a:p>
             <a:fld id="{D997B5FA-0921-464F-AAE1-844C04324D75}" type="datetimeFigureOut">
               <a:rPr lang="zh-CN" altLang="en-US" smtClean="0"/>
-              <a:t>2016/2/2</a:t>
+              <a:t>2016/2/3</a:t>
             </a:fld>
             <a:endParaRPr lang="zh-CN" altLang="en-US"/>
           </a:p>
@@ -765,7 +765,7 @@
           <a:p>
             <a:fld id="{D997B5FA-0921-464F-AAE1-844C04324D75}" type="datetimeFigureOut">
               <a:rPr lang="zh-CN" altLang="en-US" smtClean="0"/>
-              <a:t>2016/2/2</a:t>
+              <a:t>2016/2/3</a:t>
             </a:fld>
             <a:endParaRPr lang="zh-CN" altLang="en-US"/>
           </a:p>
@@ -1011,7 +1011,7 @@
           <a:p>
             <a:fld id="{D997B5FA-0921-464F-AAE1-844C04324D75}" type="datetimeFigureOut">
               <a:rPr lang="zh-CN" altLang="en-US" smtClean="0"/>
-              <a:t>2016/2/2</a:t>
+              <a:t>2016/2/3</a:t>
             </a:fld>
             <a:endParaRPr lang="zh-CN" altLang="en-US"/>
           </a:p>
@@ -1243,7 +1243,7 @@
           <a:p>
             <a:fld id="{D997B5FA-0921-464F-AAE1-844C04324D75}" type="datetimeFigureOut">
               <a:rPr lang="zh-CN" altLang="en-US" smtClean="0"/>
-              <a:t>2016/2/2</a:t>
+              <a:t>2016/2/3</a:t>
             </a:fld>
             <a:endParaRPr lang="zh-CN" altLang="en-US"/>
           </a:p>
@@ -1610,7 +1610,7 @@
           <a:p>
             <a:fld id="{D997B5FA-0921-464F-AAE1-844C04324D75}" type="datetimeFigureOut">
               <a:rPr lang="zh-CN" altLang="en-US" smtClean="0"/>
-              <a:t>2016/2/2</a:t>
+              <a:t>2016/2/3</a:t>
             </a:fld>
             <a:endParaRPr lang="zh-CN" altLang="en-US"/>
           </a:p>
@@ -1728,7 +1728,7 @@
           <a:p>
             <a:fld id="{D997B5FA-0921-464F-AAE1-844C04324D75}" type="datetimeFigureOut">
               <a:rPr lang="zh-CN" altLang="en-US" smtClean="0"/>
-              <a:t>2016/2/2</a:t>
+              <a:t>2016/2/3</a:t>
             </a:fld>
             <a:endParaRPr lang="zh-CN" altLang="en-US"/>
           </a:p>
@@ -1823,7 +1823,7 @@
           <a:p>
             <a:fld id="{D997B5FA-0921-464F-AAE1-844C04324D75}" type="datetimeFigureOut">
               <a:rPr lang="zh-CN" altLang="en-US" smtClean="0"/>
-              <a:t>2016/2/2</a:t>
+              <a:t>2016/2/3</a:t>
             </a:fld>
             <a:endParaRPr lang="zh-CN" altLang="en-US"/>
           </a:p>
@@ -2100,7 +2100,7 @@
           <a:p>
             <a:fld id="{D997B5FA-0921-464F-AAE1-844C04324D75}" type="datetimeFigureOut">
               <a:rPr lang="zh-CN" altLang="en-US" smtClean="0"/>
-              <a:t>2016/2/2</a:t>
+              <a:t>2016/2/3</a:t>
             </a:fld>
             <a:endParaRPr lang="zh-CN" altLang="en-US"/>
           </a:p>
@@ -2353,7 +2353,7 @@
           <a:p>
             <a:fld id="{D997B5FA-0921-464F-AAE1-844C04324D75}" type="datetimeFigureOut">
               <a:rPr lang="zh-CN" altLang="en-US" smtClean="0"/>
-              <a:t>2016/2/2</a:t>
+              <a:t>2016/2/3</a:t>
             </a:fld>
             <a:endParaRPr lang="zh-CN" altLang="en-US"/>
           </a:p>
@@ -2566,7 +2566,7 @@
           <a:p>
             <a:fld id="{D997B5FA-0921-464F-AAE1-844C04324D75}" type="datetimeFigureOut">
               <a:rPr lang="zh-CN" altLang="en-US" smtClean="0"/>
-              <a:t>2016/2/2</a:t>
+              <a:t>2016/2/3</a:t>
             </a:fld>
             <a:endParaRPr lang="zh-CN" altLang="en-US"/>
           </a:p>
@@ -4326,11 +4326,15 @@
               </a:r>
               <a:r>
                 <a:rPr lang="en-US" altLang="zh-CN" dirty="0" err="1" smtClean="0"/>
-                <a:t>Ilinq</a:t>
+                <a:t>ILinq</a:t>
               </a:r>
               <a:r>
                 <a:rPr lang="en-US" altLang="zh-CN" dirty="0" smtClean="0"/>
-                <a:t>(Of Integer) </a:t>
+                <a:t>(Of </a:t>
+              </a:r>
+              <a:r>
+                <a:rPr lang="en-US" altLang="zh-CN" dirty="0" smtClean="0"/>
+                <a:t>Integer) </a:t>
               </a:r>
               <a:r>
                 <a:rPr lang="en-US" altLang="zh-CN" dirty="0"/>

</xml_diff>

<commit_message>
Resolves of the namespace problem
</commit_message>
<xml_diff>
--- a/Parallel.pptx
+++ b/Parallel.pptx
@@ -8,6 +8,8 @@
     <p:sldId id="257" r:id="rId2"/>
     <p:sldId id="258" r:id="rId3"/>
     <p:sldId id="256" r:id="rId4"/>
+    <p:sldId id="259" r:id="rId5"/>
+    <p:sldId id="260" r:id="rId6"/>
   </p:sldIdLst>
   <p:sldSz cx="12192000" cy="6858000"/>
   <p:notesSz cx="6858000" cy="9144000"/>
@@ -245,7 +247,7 @@
           <a:p>
             <a:fld id="{D997B5FA-0921-464F-AAE1-844C04324D75}" type="datetimeFigureOut">
               <a:rPr lang="zh-CN" altLang="en-US" smtClean="0"/>
-              <a:t>2016/2/3</a:t>
+              <a:t>2016/2/5</a:t>
             </a:fld>
             <a:endParaRPr lang="zh-CN" altLang="en-US"/>
           </a:p>
@@ -415,7 +417,7 @@
           <a:p>
             <a:fld id="{D997B5FA-0921-464F-AAE1-844C04324D75}" type="datetimeFigureOut">
               <a:rPr lang="zh-CN" altLang="en-US" smtClean="0"/>
-              <a:t>2016/2/3</a:t>
+              <a:t>2016/2/5</a:t>
             </a:fld>
             <a:endParaRPr lang="zh-CN" altLang="en-US"/>
           </a:p>
@@ -595,7 +597,7 @@
           <a:p>
             <a:fld id="{D997B5FA-0921-464F-AAE1-844C04324D75}" type="datetimeFigureOut">
               <a:rPr lang="zh-CN" altLang="en-US" smtClean="0"/>
-              <a:t>2016/2/3</a:t>
+              <a:t>2016/2/5</a:t>
             </a:fld>
             <a:endParaRPr lang="zh-CN" altLang="en-US"/>
           </a:p>
@@ -765,7 +767,7 @@
           <a:p>
             <a:fld id="{D997B5FA-0921-464F-AAE1-844C04324D75}" type="datetimeFigureOut">
               <a:rPr lang="zh-CN" altLang="en-US" smtClean="0"/>
-              <a:t>2016/2/3</a:t>
+              <a:t>2016/2/5</a:t>
             </a:fld>
             <a:endParaRPr lang="zh-CN" altLang="en-US"/>
           </a:p>
@@ -1011,7 +1013,7 @@
           <a:p>
             <a:fld id="{D997B5FA-0921-464F-AAE1-844C04324D75}" type="datetimeFigureOut">
               <a:rPr lang="zh-CN" altLang="en-US" smtClean="0"/>
-              <a:t>2016/2/3</a:t>
+              <a:t>2016/2/5</a:t>
             </a:fld>
             <a:endParaRPr lang="zh-CN" altLang="en-US"/>
           </a:p>
@@ -1243,7 +1245,7 @@
           <a:p>
             <a:fld id="{D997B5FA-0921-464F-AAE1-844C04324D75}" type="datetimeFigureOut">
               <a:rPr lang="zh-CN" altLang="en-US" smtClean="0"/>
-              <a:t>2016/2/3</a:t>
+              <a:t>2016/2/5</a:t>
             </a:fld>
             <a:endParaRPr lang="zh-CN" altLang="en-US"/>
           </a:p>
@@ -1610,7 +1612,7 @@
           <a:p>
             <a:fld id="{D997B5FA-0921-464F-AAE1-844C04324D75}" type="datetimeFigureOut">
               <a:rPr lang="zh-CN" altLang="en-US" smtClean="0"/>
-              <a:t>2016/2/3</a:t>
+              <a:t>2016/2/5</a:t>
             </a:fld>
             <a:endParaRPr lang="zh-CN" altLang="en-US"/>
           </a:p>
@@ -1728,7 +1730,7 @@
           <a:p>
             <a:fld id="{D997B5FA-0921-464F-AAE1-844C04324D75}" type="datetimeFigureOut">
               <a:rPr lang="zh-CN" altLang="en-US" smtClean="0"/>
-              <a:t>2016/2/3</a:t>
+              <a:t>2016/2/5</a:t>
             </a:fld>
             <a:endParaRPr lang="zh-CN" altLang="en-US"/>
           </a:p>
@@ -1823,7 +1825,7 @@
           <a:p>
             <a:fld id="{D997B5FA-0921-464F-AAE1-844C04324D75}" type="datetimeFigureOut">
               <a:rPr lang="zh-CN" altLang="en-US" smtClean="0"/>
-              <a:t>2016/2/3</a:t>
+              <a:t>2016/2/5</a:t>
             </a:fld>
             <a:endParaRPr lang="zh-CN" altLang="en-US"/>
           </a:p>
@@ -2100,7 +2102,7 @@
           <a:p>
             <a:fld id="{D997B5FA-0921-464F-AAE1-844C04324D75}" type="datetimeFigureOut">
               <a:rPr lang="zh-CN" altLang="en-US" smtClean="0"/>
-              <a:t>2016/2/3</a:t>
+              <a:t>2016/2/5</a:t>
             </a:fld>
             <a:endParaRPr lang="zh-CN" altLang="en-US"/>
           </a:p>
@@ -2353,7 +2355,7 @@
           <a:p>
             <a:fld id="{D997B5FA-0921-464F-AAE1-844C04324D75}" type="datetimeFigureOut">
               <a:rPr lang="zh-CN" altLang="en-US" smtClean="0"/>
-              <a:t>2016/2/3</a:t>
+              <a:t>2016/2/5</a:t>
             </a:fld>
             <a:endParaRPr lang="zh-CN" altLang="en-US"/>
           </a:p>
@@ -2566,7 +2568,7 @@
           <a:p>
             <a:fld id="{D997B5FA-0921-464F-AAE1-844C04324D75}" type="datetimeFigureOut">
               <a:rPr lang="zh-CN" altLang="en-US" smtClean="0"/>
-              <a:t>2016/2/3</a:t>
+              <a:t>2016/2/5</a:t>
             </a:fld>
             <a:endParaRPr lang="zh-CN" altLang="en-US"/>
           </a:p>
@@ -4330,11 +4332,7 @@
               </a:r>
               <a:r>
                 <a:rPr lang="en-US" altLang="zh-CN" dirty="0" smtClean="0"/>
-                <a:t>(Of </a:t>
-              </a:r>
-              <a:r>
-                <a:rPr lang="en-US" altLang="zh-CN" dirty="0" smtClean="0"/>
-                <a:t>Integer) </a:t>
+                <a:t>(Of Integer) </a:t>
               </a:r>
               <a:r>
                 <a:rPr lang="en-US" altLang="zh-CN" dirty="0"/>
@@ -5046,6 +5044,1365 @@
     <p:extLst>
       <p:ext uri="{BB962C8B-B14F-4D97-AF65-F5344CB8AC3E}">
         <p14:creationId xmlns:p14="http://schemas.microsoft.com/office/powerpoint/2010/main" val="3516613942"/>
+      </p:ext>
+    </p:extLst>
+  </p:cSld>
+  <p:clrMapOvr>
+    <a:masterClrMapping/>
+  </p:clrMapOvr>
+</p:sld>
+</file>
+
+<file path=ppt/slides/slide4.xml><?xml version="1.0" encoding="utf-8"?>
+<p:sld xmlns:a="http://schemas.openxmlformats.org/drawingml/2006/main" xmlns:r="http://schemas.openxmlformats.org/officeDocument/2006/relationships" xmlns:p="http://schemas.openxmlformats.org/presentationml/2006/main">
+  <p:cSld>
+    <p:spTree>
+      <p:nvGrpSpPr>
+        <p:cNvPr id="1" name=""/>
+        <p:cNvGrpSpPr/>
+        <p:nvPr/>
+      </p:nvGrpSpPr>
+      <p:grpSpPr>
+        <a:xfrm>
+          <a:off x="0" y="0"/>
+          <a:ext cx="0" cy="0"/>
+          <a:chOff x="0" y="0"/>
+          <a:chExt cx="0" cy="0"/>
+        </a:xfrm>
+      </p:grpSpPr>
+      <p:grpSp>
+        <p:nvGrpSpPr>
+          <p:cNvPr id="27" name="组合 26"/>
+          <p:cNvGrpSpPr/>
+          <p:nvPr/>
+        </p:nvGrpSpPr>
+        <p:grpSpPr>
+          <a:xfrm>
+            <a:off x="484405" y="701274"/>
+            <a:ext cx="10019666" cy="5448018"/>
+            <a:chOff x="484405" y="701274"/>
+            <a:chExt cx="10019666" cy="5448018"/>
+          </a:xfrm>
+        </p:grpSpPr>
+        <p:sp>
+          <p:nvSpPr>
+            <p:cNvPr id="4" name="文本框 3"/>
+            <p:cNvSpPr txBox="1"/>
+            <p:nvPr/>
+          </p:nvSpPr>
+          <p:spPr>
+            <a:xfrm>
+              <a:off x="484405" y="701274"/>
+              <a:ext cx="9580571" cy="1754326"/>
+            </a:xfrm>
+            <a:prstGeom prst="rect">
+              <a:avLst/>
+            </a:prstGeom>
+            <a:noFill/>
+          </p:spPr>
+          <p:txBody>
+            <a:bodyPr wrap="none" rtlCol="0">
+              <a:spAutoFit/>
+            </a:bodyPr>
+            <a:lstStyle/>
+            <a:p>
+              <a:r>
+                <a:rPr lang="en-US" altLang="zh-CN" dirty="0" err="1" smtClean="0">
+                  <a:sym typeface="Wingdings" panose="05000000000000000000" pitchFamily="2" charset="2"/>
+                </a:rPr>
+                <a:t>LocalMachine</a:t>
+              </a:r>
+              <a:endParaRPr lang="en-US" altLang="zh-CN" dirty="0" smtClean="0">
+                <a:sym typeface="Wingdings" panose="05000000000000000000" pitchFamily="2" charset="2"/>
+              </a:endParaRPr>
+            </a:p>
+            <a:p>
+              <a:endParaRPr lang="en-US" altLang="zh-CN" dirty="0" smtClean="0">
+                <a:sym typeface="Wingdings" panose="05000000000000000000" pitchFamily="2" charset="2"/>
+              </a:endParaRPr>
+            </a:p>
+            <a:p>
+              <a:pPr marL="285750" indent="-285750">
+                <a:buFont typeface="Wingdings" panose="05000000000000000000" pitchFamily="2" charset="2"/>
+                <a:buChar char="à"/>
+              </a:pPr>
+              <a:r>
+                <a:rPr lang="en-US" altLang="zh-CN" dirty="0" smtClean="0"/>
+                <a:t>Public </a:t>
+              </a:r>
+              <a:r>
+                <a:rPr lang="en-US" altLang="zh-CN" dirty="0"/>
+                <a:t>Function Invoke(target As [Delegate], </a:t>
+              </a:r>
+              <a:r>
+                <a:rPr lang="en-US" altLang="zh-CN" dirty="0" err="1"/>
+                <a:t>ParamArray</a:t>
+              </a:r>
+              <a:r>
+                <a:rPr lang="en-US" altLang="zh-CN" dirty="0"/>
+                <a:t> </a:t>
+              </a:r>
+              <a:r>
+                <a:rPr lang="en-US" altLang="zh-CN" dirty="0" err="1"/>
+                <a:t>args</a:t>
+              </a:r>
+              <a:r>
+                <a:rPr lang="en-US" altLang="zh-CN" dirty="0"/>
+                <a:t> As Object()) As </a:t>
+              </a:r>
+              <a:r>
+                <a:rPr lang="en-US" altLang="zh-CN" dirty="0" smtClean="0"/>
+                <a:t>Object</a:t>
+              </a:r>
+            </a:p>
+            <a:p>
+              <a:r>
+                <a:rPr lang="en-US" altLang="zh-CN" dirty="0" smtClean="0"/>
+                <a:t>            Dim </a:t>
+              </a:r>
+              <a:r>
+                <a:rPr lang="en-US" altLang="zh-CN" dirty="0" err="1"/>
+                <a:t>req</a:t>
+              </a:r>
+              <a:r>
+                <a:rPr lang="en-US" altLang="zh-CN" dirty="0"/>
+                <a:t> As </a:t>
+              </a:r>
+              <a:r>
+                <a:rPr lang="en-US" altLang="zh-CN" dirty="0" err="1"/>
+                <a:t>RequestStream</a:t>
+              </a:r>
+              <a:r>
+                <a:rPr lang="en-US" altLang="zh-CN" dirty="0"/>
+                <a:t> = New </a:t>
+              </a:r>
+              <a:r>
+                <a:rPr lang="en-US" altLang="zh-CN" dirty="0" err="1"/>
+                <a:t>RequestStream</a:t>
+              </a:r>
+              <a:r>
+                <a:rPr lang="en-US" altLang="zh-CN" dirty="0"/>
+                <a:t>(</a:t>
+              </a:r>
+              <a:r>
+                <a:rPr lang="en-US" altLang="zh-CN" dirty="0" err="1"/>
+                <a:t>ProtocolEntry</a:t>
+              </a:r>
+              <a:r>
+                <a:rPr lang="en-US" altLang="zh-CN" dirty="0"/>
+                <a:t>, </a:t>
+              </a:r>
+              <a:r>
+                <a:rPr lang="en-US" altLang="zh-CN" b="1" dirty="0" err="1">
+                  <a:solidFill>
+                    <a:srgbClr val="FF0000"/>
+                  </a:solidFill>
+                </a:rPr>
+                <a:t>TaskProtocols.Invoke</a:t>
+              </a:r>
+              <a:r>
+                <a:rPr lang="en-US" altLang="zh-CN" dirty="0"/>
+                <a:t>, value)</a:t>
+              </a:r>
+            </a:p>
+            <a:p>
+              <a:r>
+                <a:rPr lang="en-US" altLang="zh-CN" dirty="0"/>
+                <a:t>            Dim rep As </a:t>
+              </a:r>
+              <a:r>
+                <a:rPr lang="en-US" altLang="zh-CN" dirty="0" err="1"/>
+                <a:t>RequestStream</a:t>
+              </a:r>
+              <a:r>
+                <a:rPr lang="en-US" altLang="zh-CN" dirty="0"/>
+                <a:t> = New </a:t>
+              </a:r>
+              <a:r>
+                <a:rPr lang="en-US" altLang="zh-CN" dirty="0" err="1"/>
+                <a:t>AsynInvoke</a:t>
+              </a:r>
+              <a:r>
+                <a:rPr lang="en-US" altLang="zh-CN" dirty="0"/>
+                <a:t>(_remote).</a:t>
+              </a:r>
+              <a:r>
+                <a:rPr lang="en-US" altLang="zh-CN" dirty="0" err="1"/>
+                <a:t>SendMessage</a:t>
+              </a:r>
+              <a:r>
+                <a:rPr lang="en-US" altLang="zh-CN" dirty="0"/>
+                <a:t>(</a:t>
+              </a:r>
+              <a:r>
+                <a:rPr lang="en-US" altLang="zh-CN" dirty="0" err="1"/>
+                <a:t>req</a:t>
+              </a:r>
+              <a:r>
+                <a:rPr lang="en-US" altLang="zh-CN" dirty="0"/>
+                <a:t>)</a:t>
+              </a:r>
+            </a:p>
+            <a:p>
+              <a:r>
+                <a:rPr lang="en-US" altLang="zh-CN" dirty="0"/>
+                <a:t>            Dim </a:t>
+              </a:r>
+              <a:r>
+                <a:rPr lang="en-US" altLang="zh-CN" dirty="0" err="1"/>
+                <a:t>rtvl</a:t>
+              </a:r>
+              <a:r>
+                <a:rPr lang="en-US" altLang="zh-CN" dirty="0"/>
+                <a:t> As </a:t>
+              </a:r>
+              <a:r>
+                <a:rPr lang="en-US" altLang="zh-CN" dirty="0" err="1"/>
+                <a:t>Rtvl</a:t>
+              </a:r>
+              <a:r>
+                <a:rPr lang="en-US" altLang="zh-CN" dirty="0"/>
+                <a:t> = </a:t>
+              </a:r>
+              <a:r>
+                <a:rPr lang="en-US" altLang="zh-CN" dirty="0" err="1"/>
+                <a:t>Serialization.LoadObject</a:t>
+              </a:r>
+              <a:r>
+                <a:rPr lang="en-US" altLang="zh-CN" dirty="0"/>
+                <a:t>(Of </a:t>
+              </a:r>
+              <a:r>
+                <a:rPr lang="en-US" altLang="zh-CN" dirty="0" err="1"/>
+                <a:t>Rtvl</a:t>
+              </a:r>
+              <a:r>
+                <a:rPr lang="en-US" altLang="zh-CN" dirty="0"/>
+                <a:t>)(rep.GetUTF8String)</a:t>
+              </a:r>
+              <a:endParaRPr lang="zh-CN" altLang="en-US" dirty="0"/>
+            </a:p>
+          </p:txBody>
+        </p:sp>
+        <p:sp>
+          <p:nvSpPr>
+            <p:cNvPr id="5" name="文本框 4"/>
+            <p:cNvSpPr txBox="1"/>
+            <p:nvPr/>
+          </p:nvSpPr>
+          <p:spPr>
+            <a:xfrm>
+              <a:off x="484405" y="3840968"/>
+              <a:ext cx="10019666" cy="2308324"/>
+            </a:xfrm>
+            <a:prstGeom prst="rect">
+              <a:avLst/>
+            </a:prstGeom>
+            <a:noFill/>
+          </p:spPr>
+          <p:txBody>
+            <a:bodyPr wrap="none" rtlCol="0">
+              <a:spAutoFit/>
+            </a:bodyPr>
+            <a:lstStyle/>
+            <a:p>
+              <a:r>
+                <a:rPr lang="en-US" altLang="zh-CN" dirty="0" err="1" smtClean="0">
+                  <a:sym typeface="Wingdings" panose="05000000000000000000" pitchFamily="2" charset="2"/>
+                </a:rPr>
+                <a:t>RemoteMachine</a:t>
+              </a:r>
+              <a:endParaRPr lang="en-US" altLang="zh-CN" dirty="0" smtClean="0">
+                <a:sym typeface="Wingdings" panose="05000000000000000000" pitchFamily="2" charset="2"/>
+              </a:endParaRPr>
+            </a:p>
+            <a:p>
+              <a:endParaRPr lang="en-US" altLang="zh-CN" dirty="0" smtClean="0">
+                <a:sym typeface="Wingdings" panose="05000000000000000000" pitchFamily="2" charset="2"/>
+              </a:endParaRPr>
+            </a:p>
+            <a:p>
+              <a:r>
+                <a:rPr lang="en-US" altLang="zh-CN" dirty="0" smtClean="0">
+                  <a:sym typeface="Wingdings" panose="05000000000000000000" pitchFamily="2" charset="2"/>
+                </a:rPr>
+                <a:t> </a:t>
+              </a:r>
+              <a:r>
+                <a:rPr lang="en-US" altLang="zh-CN" dirty="0"/>
+                <a:t> &lt;</a:t>
+              </a:r>
+              <a:r>
+                <a:rPr lang="en-US" altLang="zh-CN" b="1" dirty="0">
+                  <a:solidFill>
+                    <a:srgbClr val="FF0000"/>
+                  </a:solidFill>
+                </a:rPr>
+                <a:t>Protocol(</a:t>
+              </a:r>
+              <a:r>
+                <a:rPr lang="en-US" altLang="zh-CN" b="1" dirty="0" err="1">
+                  <a:solidFill>
+                    <a:srgbClr val="FF0000"/>
+                  </a:solidFill>
+                </a:rPr>
+                <a:t>TaskProtocols.Invoke</a:t>
+              </a:r>
+              <a:r>
+                <a:rPr lang="en-US" altLang="zh-CN" b="1" dirty="0">
+                  <a:solidFill>
+                    <a:srgbClr val="FF0000"/>
+                  </a:solidFill>
+                </a:rPr>
+                <a:t>)</a:t>
+              </a:r>
+              <a:r>
+                <a:rPr lang="en-US" altLang="zh-CN" dirty="0"/>
+                <a:t>&gt;</a:t>
+              </a:r>
+            </a:p>
+            <a:p>
+              <a:r>
+                <a:rPr lang="en-US" altLang="zh-CN" dirty="0"/>
+                <a:t>      </a:t>
+              </a:r>
+              <a:r>
+                <a:rPr lang="en-US" altLang="zh-CN" dirty="0" smtClean="0"/>
+                <a:t>Private </a:t>
+              </a:r>
+              <a:r>
+                <a:rPr lang="en-US" altLang="zh-CN" dirty="0"/>
+                <a:t>Function Invoke(CA As Long, </a:t>
+              </a:r>
+              <a:r>
+                <a:rPr lang="en-US" altLang="zh-CN" i="1" dirty="0" err="1">
+                  <a:solidFill>
+                    <a:srgbClr val="FF0000"/>
+                  </a:solidFill>
+                </a:rPr>
+                <a:t>args</a:t>
+              </a:r>
+              <a:r>
+                <a:rPr lang="en-US" altLang="zh-CN" i="1" dirty="0">
+                  <a:solidFill>
+                    <a:srgbClr val="FF0000"/>
+                  </a:solidFill>
+                </a:rPr>
+                <a:t> As </a:t>
+              </a:r>
+              <a:r>
+                <a:rPr lang="en-US" altLang="zh-CN" i="1" dirty="0" err="1">
+                  <a:solidFill>
+                    <a:srgbClr val="FF0000"/>
+                  </a:solidFill>
+                </a:rPr>
+                <a:t>RequestStream</a:t>
+              </a:r>
+              <a:r>
+                <a:rPr lang="en-US" altLang="zh-CN" dirty="0"/>
+                <a:t>, remote As </a:t>
+              </a:r>
+              <a:r>
+                <a:rPr lang="en-US" altLang="zh-CN" dirty="0" err="1" smtClean="0"/>
+                <a:t>IPEndPoint</a:t>
+              </a:r>
+              <a:r>
+                <a:rPr lang="en-US" altLang="zh-CN" dirty="0"/>
+                <a:t>) As </a:t>
+              </a:r>
+              <a:r>
+                <a:rPr lang="en-US" altLang="zh-CN" i="1" dirty="0" err="1">
+                  <a:solidFill>
+                    <a:srgbClr val="FF0000"/>
+                  </a:solidFill>
+                </a:rPr>
+                <a:t>RequestStream</a:t>
+              </a:r>
+              <a:endParaRPr lang="en-US" altLang="zh-CN" i="1" dirty="0">
+                <a:solidFill>
+                  <a:srgbClr val="FF0000"/>
+                </a:solidFill>
+              </a:endParaRPr>
+            </a:p>
+            <a:p>
+              <a:r>
+                <a:rPr lang="en-US" altLang="zh-CN" dirty="0"/>
+                <a:t>            Dim </a:t>
+              </a:r>
+              <a:r>
+                <a:rPr lang="en-US" altLang="zh-CN" dirty="0" err="1"/>
+                <a:t>params</a:t>
+              </a:r>
+              <a:r>
+                <a:rPr lang="en-US" altLang="zh-CN" dirty="0"/>
+                <a:t> As </a:t>
+              </a:r>
+              <a:r>
+                <a:rPr lang="en-US" altLang="zh-CN" dirty="0" err="1"/>
+                <a:t>InvokeInfo</a:t>
+              </a:r>
+              <a:r>
+                <a:rPr lang="en-US" altLang="zh-CN" dirty="0"/>
+                <a:t> = </a:t>
+              </a:r>
+              <a:r>
+                <a:rPr lang="en-US" altLang="zh-CN" dirty="0" err="1"/>
+                <a:t>Serialization.LoadObject</a:t>
+              </a:r>
+              <a:r>
+                <a:rPr lang="en-US" altLang="zh-CN" dirty="0"/>
+                <a:t>(Of </a:t>
+              </a:r>
+              <a:r>
+                <a:rPr lang="en-US" altLang="zh-CN" dirty="0" err="1"/>
+                <a:t>InvokeInfo</a:t>
+              </a:r>
+              <a:r>
+                <a:rPr lang="en-US" altLang="zh-CN" dirty="0"/>
+                <a:t>)(args.GetUTF8String)</a:t>
+              </a:r>
+            </a:p>
+            <a:p>
+              <a:r>
+                <a:rPr lang="en-US" altLang="zh-CN" dirty="0"/>
+                <a:t>            Dim value As </a:t>
+              </a:r>
+              <a:r>
+                <a:rPr lang="en-US" altLang="zh-CN" dirty="0" err="1"/>
+                <a:t>Rtvl</a:t>
+              </a:r>
+              <a:r>
+                <a:rPr lang="en-US" altLang="zh-CN" dirty="0"/>
+                <a:t> = Invoke(</a:t>
+              </a:r>
+              <a:r>
+                <a:rPr lang="en-US" altLang="zh-CN" dirty="0" err="1"/>
+                <a:t>params</a:t>
+              </a:r>
+              <a:r>
+                <a:rPr lang="en-US" altLang="zh-CN" dirty="0"/>
+                <a:t>)</a:t>
+              </a:r>
+            </a:p>
+            <a:p>
+              <a:r>
+                <a:rPr lang="en-US" altLang="zh-CN" dirty="0"/>
+                <a:t>            Return New </a:t>
+              </a:r>
+              <a:r>
+                <a:rPr lang="en-US" altLang="zh-CN" dirty="0" err="1"/>
+                <a:t>RequestStream</a:t>
+              </a:r>
+              <a:r>
+                <a:rPr lang="en-US" altLang="zh-CN" dirty="0"/>
+                <a:t>(</a:t>
+              </a:r>
+              <a:r>
+                <a:rPr lang="en-US" altLang="zh-CN" dirty="0" err="1"/>
+                <a:t>value.GetJson</a:t>
+              </a:r>
+              <a:r>
+                <a:rPr lang="en-US" altLang="zh-CN" dirty="0"/>
+                <a:t>)</a:t>
+              </a:r>
+            </a:p>
+            <a:p>
+              <a:r>
+                <a:rPr lang="en-US" altLang="zh-CN" dirty="0"/>
+                <a:t>      </a:t>
+              </a:r>
+              <a:r>
+                <a:rPr lang="en-US" altLang="zh-CN" dirty="0" smtClean="0"/>
+                <a:t>End </a:t>
+              </a:r>
+              <a:r>
+                <a:rPr lang="en-US" altLang="zh-CN" dirty="0"/>
+                <a:t>Function</a:t>
+              </a:r>
+              <a:endParaRPr lang="zh-CN" altLang="en-US" dirty="0"/>
+            </a:p>
+          </p:txBody>
+        </p:sp>
+        <p:cxnSp>
+          <p:nvCxnSpPr>
+            <p:cNvPr id="7" name="肘形连接符 6"/>
+            <p:cNvCxnSpPr/>
+            <p:nvPr/>
+          </p:nvCxnSpPr>
+          <p:spPr>
+            <a:xfrm rot="10800000" flipV="1">
+              <a:off x="4146987" y="1837129"/>
+              <a:ext cx="4614459" cy="2636952"/>
+            </a:xfrm>
+            <a:prstGeom prst="bentConnector3">
+              <a:avLst>
+                <a:gd name="adj1" fmla="val -753"/>
+              </a:avLst>
+            </a:prstGeom>
+            <a:ln w="63500">
+              <a:solidFill>
+                <a:srgbClr val="00B050"/>
+              </a:solidFill>
+              <a:tailEnd type="triangle"/>
+            </a:ln>
+          </p:spPr>
+          <p:style>
+            <a:lnRef idx="1">
+              <a:schemeClr val="accent1"/>
+            </a:lnRef>
+            <a:fillRef idx="0">
+              <a:schemeClr val="accent1"/>
+            </a:fillRef>
+            <a:effectRef idx="0">
+              <a:schemeClr val="accent1"/>
+            </a:effectRef>
+            <a:fontRef idx="minor">
+              <a:schemeClr val="tx1"/>
+            </a:fontRef>
+          </p:style>
+        </p:cxnSp>
+        <p:cxnSp>
+          <p:nvCxnSpPr>
+            <p:cNvPr id="15" name="肘形连接符 14"/>
+            <p:cNvCxnSpPr/>
+            <p:nvPr/>
+          </p:nvCxnSpPr>
+          <p:spPr>
+            <a:xfrm rot="5400000">
+              <a:off x="5471661" y="2205941"/>
+              <a:ext cx="2575249" cy="2530093"/>
+            </a:xfrm>
+            <a:prstGeom prst="bentConnector3">
+              <a:avLst>
+                <a:gd name="adj1" fmla="val 50000"/>
+              </a:avLst>
+            </a:prstGeom>
+            <a:ln w="63500">
+              <a:solidFill>
+                <a:schemeClr val="accent2">
+                  <a:lumMod val="75000"/>
+                </a:schemeClr>
+              </a:solidFill>
+              <a:tailEnd type="triangle"/>
+            </a:ln>
+          </p:spPr>
+          <p:style>
+            <a:lnRef idx="1">
+              <a:schemeClr val="accent1"/>
+            </a:lnRef>
+            <a:fillRef idx="0">
+              <a:schemeClr val="accent1"/>
+            </a:fillRef>
+            <a:effectRef idx="0">
+              <a:schemeClr val="accent1"/>
+            </a:effectRef>
+            <a:fontRef idx="minor">
+              <a:schemeClr val="tx1"/>
+            </a:fontRef>
+          </p:style>
+        </p:cxnSp>
+        <p:cxnSp>
+          <p:nvCxnSpPr>
+            <p:cNvPr id="19" name="肘形连接符 18"/>
+            <p:cNvCxnSpPr>
+              <a:stCxn id="5" idx="3"/>
+              <a:endCxn id="4" idx="2"/>
+            </p:cNvCxnSpPr>
+            <p:nvPr/>
+          </p:nvCxnSpPr>
+          <p:spPr>
+            <a:xfrm flipH="1" flipV="1">
+              <a:off x="5274691" y="2455600"/>
+              <a:ext cx="5229380" cy="2539530"/>
+            </a:xfrm>
+            <a:prstGeom prst="bentConnector4">
+              <a:avLst>
+                <a:gd name="adj1" fmla="val -4371"/>
+                <a:gd name="adj2" fmla="val 72724"/>
+              </a:avLst>
+            </a:prstGeom>
+            <a:ln w="63500">
+              <a:solidFill>
+                <a:srgbClr val="00B0F0"/>
+              </a:solidFill>
+              <a:tailEnd type="triangle"/>
+            </a:ln>
+          </p:spPr>
+          <p:style>
+            <a:lnRef idx="1">
+              <a:schemeClr val="accent1"/>
+            </a:lnRef>
+            <a:fillRef idx="0">
+              <a:schemeClr val="accent1"/>
+            </a:fillRef>
+            <a:effectRef idx="0">
+              <a:schemeClr val="accent1"/>
+            </a:effectRef>
+            <a:fontRef idx="minor">
+              <a:schemeClr val="tx1"/>
+            </a:fontRef>
+          </p:style>
+        </p:cxnSp>
+        <p:sp>
+          <p:nvSpPr>
+            <p:cNvPr id="24" name="下箭头 23"/>
+            <p:cNvSpPr/>
+            <p:nvPr/>
+          </p:nvSpPr>
+          <p:spPr>
+            <a:xfrm>
+              <a:off x="2155984" y="2743199"/>
+              <a:ext cx="961054" cy="1455576"/>
+            </a:xfrm>
+            <a:prstGeom prst="downArrow">
+              <a:avLst/>
+            </a:prstGeom>
+          </p:spPr>
+          <p:style>
+            <a:lnRef idx="0">
+              <a:schemeClr val="accent3"/>
+            </a:lnRef>
+            <a:fillRef idx="3">
+              <a:schemeClr val="accent3"/>
+            </a:fillRef>
+            <a:effectRef idx="3">
+              <a:schemeClr val="accent3"/>
+            </a:effectRef>
+            <a:fontRef idx="minor">
+              <a:schemeClr val="lt1"/>
+            </a:fontRef>
+          </p:style>
+          <p:txBody>
+            <a:bodyPr rtlCol="0" anchor="ctr"/>
+            <a:lstStyle/>
+            <a:p>
+              <a:pPr algn="ctr"/>
+              <a:endParaRPr lang="zh-CN" altLang="en-US"/>
+            </a:p>
+          </p:txBody>
+        </p:sp>
+        <p:sp>
+          <p:nvSpPr>
+            <p:cNvPr id="25" name="下箭头 24"/>
+            <p:cNvSpPr/>
+            <p:nvPr/>
+          </p:nvSpPr>
+          <p:spPr>
+            <a:xfrm rot="10800000">
+              <a:off x="4018237" y="2743199"/>
+              <a:ext cx="961054" cy="1455576"/>
+            </a:xfrm>
+            <a:prstGeom prst="downArrow">
+              <a:avLst/>
+            </a:prstGeom>
+          </p:spPr>
+          <p:style>
+            <a:lnRef idx="0">
+              <a:schemeClr val="accent3"/>
+            </a:lnRef>
+            <a:fillRef idx="3">
+              <a:schemeClr val="accent3"/>
+            </a:fillRef>
+            <a:effectRef idx="3">
+              <a:schemeClr val="accent3"/>
+            </a:effectRef>
+            <a:fontRef idx="minor">
+              <a:schemeClr val="lt1"/>
+            </a:fontRef>
+          </p:style>
+          <p:txBody>
+            <a:bodyPr rtlCol="0" anchor="ctr"/>
+            <a:lstStyle/>
+            <a:p>
+              <a:pPr algn="ctr"/>
+              <a:endParaRPr lang="zh-CN" altLang="en-US"/>
+            </a:p>
+          </p:txBody>
+        </p:sp>
+        <p:sp>
+          <p:nvSpPr>
+            <p:cNvPr id="26" name="文本框 25"/>
+            <p:cNvSpPr txBox="1"/>
+            <p:nvPr/>
+          </p:nvSpPr>
+          <p:spPr>
+            <a:xfrm>
+              <a:off x="2422648" y="3246192"/>
+              <a:ext cx="2365969" cy="369332"/>
+            </a:xfrm>
+            <a:prstGeom prst="rect">
+              <a:avLst/>
+            </a:prstGeom>
+            <a:noFill/>
+          </p:spPr>
+          <p:txBody>
+            <a:bodyPr wrap="none" rtlCol="0">
+              <a:spAutoFit/>
+            </a:bodyPr>
+            <a:lstStyle/>
+            <a:p>
+              <a:r>
+                <a:rPr lang="en-US" altLang="zh-CN" dirty="0" smtClean="0"/>
+                <a:t>Data Exchange by JSON</a:t>
+              </a:r>
+              <a:endParaRPr lang="zh-CN" altLang="en-US" dirty="0"/>
+            </a:p>
+          </p:txBody>
+        </p:sp>
+      </p:grpSp>
+    </p:spTree>
+    <p:extLst>
+      <p:ext uri="{BB962C8B-B14F-4D97-AF65-F5344CB8AC3E}">
+        <p14:creationId xmlns:p14="http://schemas.microsoft.com/office/powerpoint/2010/main" val="1744038320"/>
+      </p:ext>
+    </p:extLst>
+  </p:cSld>
+  <p:clrMapOvr>
+    <a:masterClrMapping/>
+  </p:clrMapOvr>
+</p:sld>
+</file>
+
+<file path=ppt/slides/slide5.xml><?xml version="1.0" encoding="utf-8"?>
+<p:sld xmlns:a="http://schemas.openxmlformats.org/drawingml/2006/main" xmlns:r="http://schemas.openxmlformats.org/officeDocument/2006/relationships" xmlns:p="http://schemas.openxmlformats.org/presentationml/2006/main">
+  <p:cSld>
+    <p:spTree>
+      <p:nvGrpSpPr>
+        <p:cNvPr id="1" name=""/>
+        <p:cNvGrpSpPr/>
+        <p:nvPr/>
+      </p:nvGrpSpPr>
+      <p:grpSpPr>
+        <a:xfrm>
+          <a:off x="0" y="0"/>
+          <a:ext cx="0" cy="0"/>
+          <a:chOff x="0" y="0"/>
+          <a:chExt cx="0" cy="0"/>
+        </a:xfrm>
+      </p:grpSpPr>
+      <p:grpSp>
+        <p:nvGrpSpPr>
+          <p:cNvPr id="34" name="组合 33"/>
+          <p:cNvGrpSpPr/>
+          <p:nvPr/>
+        </p:nvGrpSpPr>
+        <p:grpSpPr>
+          <a:xfrm>
+            <a:off x="255867" y="295187"/>
+            <a:ext cx="10807903" cy="5574856"/>
+            <a:chOff x="255867" y="295187"/>
+            <a:chExt cx="10807903" cy="5574856"/>
+          </a:xfrm>
+        </p:grpSpPr>
+        <p:sp>
+          <p:nvSpPr>
+            <p:cNvPr id="19" name="矩形 18"/>
+            <p:cNvSpPr/>
+            <p:nvPr/>
+          </p:nvSpPr>
+          <p:spPr>
+            <a:xfrm>
+              <a:off x="255867" y="2473311"/>
+              <a:ext cx="10716933" cy="2362854"/>
+            </a:xfrm>
+            <a:prstGeom prst="rect">
+              <a:avLst/>
+            </a:prstGeom>
+            <a:noFill/>
+            <a:ln w="63500">
+              <a:prstDash val="sysDash"/>
+            </a:ln>
+          </p:spPr>
+          <p:style>
+            <a:lnRef idx="2">
+              <a:schemeClr val="accent1">
+                <a:shade val="50000"/>
+              </a:schemeClr>
+            </a:lnRef>
+            <a:fillRef idx="1">
+              <a:schemeClr val="accent1"/>
+            </a:fillRef>
+            <a:effectRef idx="0">
+              <a:schemeClr val="accent1"/>
+            </a:effectRef>
+            <a:fontRef idx="minor">
+              <a:schemeClr val="lt1"/>
+            </a:fontRef>
+          </p:style>
+          <p:txBody>
+            <a:bodyPr rtlCol="0" anchor="ctr"/>
+            <a:lstStyle/>
+            <a:p>
+              <a:pPr algn="ctr"/>
+              <a:endParaRPr lang="zh-CN" altLang="en-US"/>
+            </a:p>
+          </p:txBody>
+        </p:sp>
+        <p:sp>
+          <p:nvSpPr>
+            <p:cNvPr id="6" name="矩形 5"/>
+            <p:cNvSpPr/>
+            <p:nvPr/>
+          </p:nvSpPr>
+          <p:spPr>
+            <a:xfrm>
+              <a:off x="300503" y="295187"/>
+              <a:ext cx="1655805" cy="560173"/>
+            </a:xfrm>
+            <a:prstGeom prst="rect">
+              <a:avLst/>
+            </a:prstGeom>
+          </p:spPr>
+          <p:style>
+            <a:lnRef idx="0">
+              <a:schemeClr val="accent4"/>
+            </a:lnRef>
+            <a:fillRef idx="3">
+              <a:schemeClr val="accent4"/>
+            </a:fillRef>
+            <a:effectRef idx="3">
+              <a:schemeClr val="accent4"/>
+            </a:effectRef>
+            <a:fontRef idx="minor">
+              <a:schemeClr val="lt1"/>
+            </a:fontRef>
+          </p:style>
+          <p:txBody>
+            <a:bodyPr rtlCol="0" anchor="ctr"/>
+            <a:lstStyle/>
+            <a:p>
+              <a:pPr algn="ctr"/>
+              <a:r>
+                <a:rPr lang="en-US" altLang="zh-CN" dirty="0" err="1" smtClean="0"/>
+                <a:t>ILinq</a:t>
+              </a:r>
+              <a:r>
+                <a:rPr lang="en-US" altLang="zh-CN" dirty="0" smtClean="0"/>
+                <a:t>(Of T)</a:t>
+              </a:r>
+              <a:endParaRPr lang="zh-CN" altLang="en-US" dirty="0"/>
+            </a:p>
+          </p:txBody>
+        </p:sp>
+        <p:sp>
+          <p:nvSpPr>
+            <p:cNvPr id="8" name="文本框 7"/>
+            <p:cNvSpPr txBox="1"/>
+            <p:nvPr/>
+          </p:nvSpPr>
+          <p:spPr>
+            <a:xfrm>
+              <a:off x="255867" y="1030990"/>
+              <a:ext cx="8440516" cy="369332"/>
+            </a:xfrm>
+            <a:prstGeom prst="rect">
+              <a:avLst/>
+            </a:prstGeom>
+            <a:noFill/>
+          </p:spPr>
+          <p:txBody>
+            <a:bodyPr wrap="none" rtlCol="0">
+              <a:spAutoFit/>
+            </a:bodyPr>
+            <a:lstStyle/>
+            <a:p>
+              <a:r>
+                <a:rPr lang="en-US" altLang="zh-CN" dirty="0" err="1"/>
+                <a:t>ReadOnly</a:t>
+              </a:r>
+              <a:r>
+                <a:rPr lang="en-US" altLang="zh-CN" dirty="0"/>
+                <a:t> </a:t>
+              </a:r>
+              <a:r>
+                <a:rPr lang="en-US" altLang="zh-CN" dirty="0" err="1"/>
+                <a:t>req</a:t>
+              </a:r>
+              <a:r>
+                <a:rPr lang="en-US" altLang="zh-CN" dirty="0"/>
+                <a:t> As New </a:t>
+              </a:r>
+              <a:r>
+                <a:rPr lang="en-US" altLang="zh-CN" dirty="0" err="1"/>
+                <a:t>RequestStream</a:t>
+              </a:r>
+              <a:r>
+                <a:rPr lang="en-US" altLang="zh-CN" dirty="0"/>
+                <a:t>(</a:t>
+              </a:r>
+              <a:r>
+                <a:rPr lang="en-US" altLang="zh-CN" dirty="0" err="1"/>
+                <a:t>Protocols.ProtocolEntry</a:t>
+              </a:r>
+              <a:r>
+                <a:rPr lang="en-US" altLang="zh-CN" dirty="0"/>
+                <a:t>, </a:t>
+              </a:r>
+              <a:r>
+                <a:rPr lang="en-US" altLang="zh-CN" b="1" dirty="0" err="1">
+                  <a:solidFill>
+                    <a:srgbClr val="FF0000"/>
+                  </a:solidFill>
+                </a:rPr>
+                <a:t>TaskProtocols.MoveNext</a:t>
+              </a:r>
+              <a:r>
+                <a:rPr lang="en-US" altLang="zh-CN" dirty="0"/>
+                <a:t>)</a:t>
+              </a:r>
+              <a:endParaRPr lang="zh-CN" altLang="en-US" dirty="0"/>
+            </a:p>
+          </p:txBody>
+        </p:sp>
+        <p:sp>
+          <p:nvSpPr>
+            <p:cNvPr id="9" name="文本框 8"/>
+            <p:cNvSpPr txBox="1"/>
+            <p:nvPr/>
+          </p:nvSpPr>
+          <p:spPr>
+            <a:xfrm>
+              <a:off x="300503" y="2527841"/>
+              <a:ext cx="10763267" cy="2308324"/>
+            </a:xfrm>
+            <a:prstGeom prst="rect">
+              <a:avLst/>
+            </a:prstGeom>
+            <a:noFill/>
+          </p:spPr>
+          <p:txBody>
+            <a:bodyPr wrap="none" rtlCol="0">
+              <a:spAutoFit/>
+            </a:bodyPr>
+            <a:lstStyle/>
+            <a:p>
+              <a:r>
+                <a:rPr lang="en-US" altLang="zh-CN" dirty="0" smtClean="0"/>
+                <a:t>&lt;</a:t>
+              </a:r>
+              <a:r>
+                <a:rPr lang="en-US" altLang="zh-CN" b="1" dirty="0">
+                  <a:solidFill>
+                    <a:srgbClr val="FF0000"/>
+                  </a:solidFill>
+                </a:rPr>
+                <a:t>Protocol(</a:t>
+              </a:r>
+              <a:r>
+                <a:rPr lang="en-US" altLang="zh-CN" b="1" dirty="0" err="1">
+                  <a:solidFill>
+                    <a:srgbClr val="FF0000"/>
+                  </a:solidFill>
+                </a:rPr>
+                <a:t>TaskProtocols.MoveNext</a:t>
+              </a:r>
+              <a:r>
+                <a:rPr lang="en-US" altLang="zh-CN" b="1" dirty="0">
+                  <a:solidFill>
+                    <a:srgbClr val="FF0000"/>
+                  </a:solidFill>
+                </a:rPr>
+                <a:t>)</a:t>
+              </a:r>
+              <a:r>
+                <a:rPr lang="en-US" altLang="zh-CN" dirty="0"/>
+                <a:t>&gt;</a:t>
+              </a:r>
+            </a:p>
+            <a:p>
+              <a:r>
+                <a:rPr lang="en-US" altLang="zh-CN" dirty="0" smtClean="0"/>
+                <a:t>Function </a:t>
+              </a:r>
+              <a:r>
+                <a:rPr lang="en-US" altLang="zh-CN" dirty="0"/>
+                <a:t>__</a:t>
+              </a:r>
+              <a:r>
+                <a:rPr lang="en-US" altLang="zh-CN" dirty="0" err="1"/>
+                <a:t>moveNext</a:t>
+              </a:r>
+              <a:r>
+                <a:rPr lang="en-US" altLang="zh-CN" dirty="0"/>
+                <a:t>(CA As Long, </a:t>
+              </a:r>
+              <a:r>
+                <a:rPr lang="en-US" altLang="zh-CN" dirty="0" err="1"/>
+                <a:t>args</a:t>
+              </a:r>
+              <a:r>
+                <a:rPr lang="en-US" altLang="zh-CN" dirty="0"/>
+                <a:t> As </a:t>
+              </a:r>
+              <a:r>
+                <a:rPr lang="en-US" altLang="zh-CN" dirty="0" err="1"/>
+                <a:t>RequestStream</a:t>
+              </a:r>
+              <a:r>
+                <a:rPr lang="en-US" altLang="zh-CN" dirty="0"/>
+                <a:t>, remote As </a:t>
+              </a:r>
+              <a:r>
+                <a:rPr lang="en-US" altLang="zh-CN" dirty="0" err="1"/>
+                <a:t>System.Net.IPEndPoint</a:t>
+              </a:r>
+              <a:r>
+                <a:rPr lang="en-US" altLang="zh-CN" dirty="0"/>
+                <a:t>) As </a:t>
+              </a:r>
+              <a:r>
+                <a:rPr lang="en-US" altLang="zh-CN" dirty="0" err="1"/>
+                <a:t>RequestStream</a:t>
+              </a:r>
+              <a:endParaRPr lang="en-US" altLang="zh-CN" dirty="0"/>
+            </a:p>
+            <a:p>
+              <a:r>
+                <a:rPr lang="en-US" altLang="zh-CN" dirty="0" smtClean="0"/>
+                <a:t>     </a:t>
+              </a:r>
+              <a:r>
+                <a:rPr lang="en-US" altLang="zh-CN" dirty="0"/>
+                <a:t>Dim value As Object = _</a:t>
+              </a:r>
+              <a:r>
+                <a:rPr lang="en-US" altLang="zh-CN" dirty="0" err="1"/>
+                <a:t>source.Current</a:t>
+              </a:r>
+              <a:endParaRPr lang="en-US" altLang="zh-CN" dirty="0"/>
+            </a:p>
+            <a:p>
+              <a:r>
+                <a:rPr lang="en-US" altLang="zh-CN" dirty="0" smtClean="0"/>
+                <a:t>     </a:t>
+              </a:r>
+              <a:r>
+                <a:rPr lang="en-US" altLang="zh-CN" dirty="0"/>
+                <a:t>Dim </a:t>
+              </a:r>
+              <a:r>
+                <a:rPr lang="en-US" altLang="zh-CN" dirty="0" err="1"/>
+                <a:t>readEnds</a:t>
+              </a:r>
+              <a:r>
+                <a:rPr lang="en-US" altLang="zh-CN" dirty="0"/>
+                <a:t> As Boolean = _</a:t>
+              </a:r>
+              <a:r>
+                <a:rPr lang="en-US" altLang="zh-CN" dirty="0" err="1"/>
+                <a:t>source.MoveNext</a:t>
+              </a:r>
+              <a:r>
+                <a:rPr lang="en-US" altLang="zh-CN" dirty="0"/>
+                <a:t>()</a:t>
+              </a:r>
+            </a:p>
+            <a:p>
+              <a:r>
+                <a:rPr lang="en-US" altLang="zh-CN" dirty="0" smtClean="0"/>
+                <a:t>     </a:t>
+              </a:r>
+              <a:r>
+                <a:rPr lang="en-US" altLang="zh-CN" dirty="0"/>
+                <a:t>Dim </a:t>
+              </a:r>
+              <a:r>
+                <a:rPr lang="en-US" altLang="zh-CN" dirty="0" err="1"/>
+                <a:t>json</a:t>
+              </a:r>
+              <a:r>
+                <a:rPr lang="en-US" altLang="zh-CN" dirty="0"/>
+                <a:t> As String = </a:t>
+              </a:r>
+              <a:r>
+                <a:rPr lang="en-US" altLang="zh-CN" dirty="0" err="1"/>
+                <a:t>Serialization.GetJson</a:t>
+              </a:r>
+              <a:r>
+                <a:rPr lang="en-US" altLang="zh-CN" dirty="0"/>
+                <a:t>(value, _type)</a:t>
+              </a:r>
+            </a:p>
+            <a:p>
+              <a:r>
+                <a:rPr lang="en-US" altLang="zh-CN" dirty="0" smtClean="0"/>
+                <a:t>     </a:t>
+              </a:r>
+              <a:r>
+                <a:rPr lang="en-US" altLang="zh-CN" dirty="0"/>
+                <a:t>Dim flag As Long = If(Not </a:t>
+              </a:r>
+              <a:r>
+                <a:rPr lang="en-US" altLang="zh-CN" dirty="0" err="1"/>
+                <a:t>readEnds</a:t>
+              </a:r>
+              <a:r>
+                <a:rPr lang="en-US" altLang="zh-CN" dirty="0"/>
+                <a:t>, </a:t>
+              </a:r>
+              <a:r>
+                <a:rPr lang="en-US" altLang="zh-CN" dirty="0" err="1"/>
+                <a:t>Protocols.TaskProtocols.ReadsDone</a:t>
+              </a:r>
+              <a:r>
+                <a:rPr lang="en-US" altLang="zh-CN" dirty="0"/>
+                <a:t>, HTTP_RFC.RFC_OK)</a:t>
+              </a:r>
+            </a:p>
+            <a:p>
+              <a:r>
+                <a:rPr lang="en-US" altLang="zh-CN" dirty="0" smtClean="0"/>
+                <a:t>     </a:t>
+              </a:r>
+              <a:r>
+                <a:rPr lang="en-US" altLang="zh-CN" dirty="0"/>
+                <a:t>Return New </a:t>
+              </a:r>
+              <a:r>
+                <a:rPr lang="en-US" altLang="zh-CN" dirty="0" err="1"/>
+                <a:t>RequestStream</a:t>
+              </a:r>
+              <a:r>
+                <a:rPr lang="en-US" altLang="zh-CN" dirty="0"/>
+                <a:t>(flag, flag, </a:t>
+              </a:r>
+              <a:r>
+                <a:rPr lang="en-US" altLang="zh-CN" dirty="0" err="1"/>
+                <a:t>json</a:t>
+              </a:r>
+              <a:r>
+                <a:rPr lang="en-US" altLang="zh-CN" dirty="0"/>
+                <a:t>)</a:t>
+              </a:r>
+            </a:p>
+            <a:p>
+              <a:r>
+                <a:rPr lang="en-US" altLang="zh-CN" dirty="0" smtClean="0"/>
+                <a:t>End </a:t>
+              </a:r>
+              <a:r>
+                <a:rPr lang="en-US" altLang="zh-CN" dirty="0"/>
+                <a:t>Function</a:t>
+              </a:r>
+              <a:endParaRPr lang="zh-CN" altLang="en-US" dirty="0"/>
+            </a:p>
+          </p:txBody>
+        </p:sp>
+        <p:cxnSp>
+          <p:nvCxnSpPr>
+            <p:cNvPr id="11" name="肘形连接符 10"/>
+            <p:cNvCxnSpPr>
+              <a:stCxn id="8" idx="3"/>
+            </p:cNvCxnSpPr>
+            <p:nvPr/>
+          </p:nvCxnSpPr>
+          <p:spPr>
+            <a:xfrm flipH="1">
+              <a:off x="3956180" y="1215656"/>
+              <a:ext cx="4740203" cy="1518213"/>
+            </a:xfrm>
+            <a:prstGeom prst="bentConnector3">
+              <a:avLst>
+                <a:gd name="adj1" fmla="val -4823"/>
+              </a:avLst>
+            </a:prstGeom>
+            <a:ln w="63500">
+              <a:solidFill>
+                <a:srgbClr val="00B0F0"/>
+              </a:solidFill>
+              <a:tailEnd type="triangle"/>
+            </a:ln>
+          </p:spPr>
+          <p:style>
+            <a:lnRef idx="1">
+              <a:schemeClr val="accent1"/>
+            </a:lnRef>
+            <a:fillRef idx="0">
+              <a:schemeClr val="accent1"/>
+            </a:fillRef>
+            <a:effectRef idx="0">
+              <a:schemeClr val="accent1"/>
+            </a:effectRef>
+            <a:fontRef idx="minor">
+              <a:schemeClr val="tx1"/>
+            </a:fontRef>
+          </p:style>
+        </p:cxnSp>
+        <p:sp>
+          <p:nvSpPr>
+            <p:cNvPr id="20" name="矩形 19"/>
+            <p:cNvSpPr/>
+            <p:nvPr/>
+          </p:nvSpPr>
+          <p:spPr>
+            <a:xfrm>
+              <a:off x="5327780" y="5076942"/>
+              <a:ext cx="2565918" cy="793101"/>
+            </a:xfrm>
+            <a:prstGeom prst="rect">
+              <a:avLst/>
+            </a:prstGeom>
+          </p:spPr>
+          <p:style>
+            <a:lnRef idx="0">
+              <a:schemeClr val="accent2"/>
+            </a:lnRef>
+            <a:fillRef idx="3">
+              <a:schemeClr val="accent2"/>
+            </a:fillRef>
+            <a:effectRef idx="3">
+              <a:schemeClr val="accent2"/>
+            </a:effectRef>
+            <a:fontRef idx="minor">
+              <a:schemeClr val="lt1"/>
+            </a:fontRef>
+          </p:style>
+          <p:txBody>
+            <a:bodyPr rtlCol="0" anchor="ctr"/>
+            <a:lstStyle/>
+            <a:p>
+              <a:pPr algn="ctr"/>
+              <a:r>
+                <a:rPr lang="en-US" altLang="zh-CN" dirty="0" err="1" smtClean="0"/>
+                <a:t>Iterator.Current</a:t>
+              </a:r>
+              <a:endParaRPr lang="en-US" altLang="zh-CN" dirty="0" smtClean="0"/>
+            </a:p>
+            <a:p>
+              <a:pPr algn="ctr"/>
+              <a:r>
+                <a:rPr lang="en-US" altLang="zh-CN" dirty="0" err="1" smtClean="0"/>
+                <a:t>Iterator.MoveNext</a:t>
+              </a:r>
+              <a:endParaRPr lang="zh-CN" altLang="en-US" dirty="0"/>
+            </a:p>
+          </p:txBody>
+        </p:sp>
+        <p:cxnSp>
+          <p:nvCxnSpPr>
+            <p:cNvPr id="21" name="肘形连接符 20"/>
+            <p:cNvCxnSpPr/>
+            <p:nvPr/>
+          </p:nvCxnSpPr>
+          <p:spPr>
+            <a:xfrm>
+              <a:off x="513184" y="3256384"/>
+              <a:ext cx="4725955" cy="2174034"/>
+            </a:xfrm>
+            <a:prstGeom prst="bentConnector3">
+              <a:avLst>
+                <a:gd name="adj1" fmla="val -3110"/>
+              </a:avLst>
+            </a:prstGeom>
+            <a:ln w="63500">
+              <a:solidFill>
+                <a:srgbClr val="00B0F0"/>
+              </a:solidFill>
+              <a:tailEnd type="triangle"/>
+            </a:ln>
+          </p:spPr>
+          <p:style>
+            <a:lnRef idx="1">
+              <a:schemeClr val="accent1"/>
+            </a:lnRef>
+            <a:fillRef idx="0">
+              <a:schemeClr val="accent1"/>
+            </a:fillRef>
+            <a:effectRef idx="0">
+              <a:schemeClr val="accent1"/>
+            </a:effectRef>
+            <a:fontRef idx="minor">
+              <a:schemeClr val="tx1"/>
+            </a:fontRef>
+          </p:style>
+        </p:cxnSp>
+        <p:cxnSp>
+          <p:nvCxnSpPr>
+            <p:cNvPr id="30" name="肘形连接符 29"/>
+            <p:cNvCxnSpPr>
+              <a:stCxn id="20" idx="3"/>
+            </p:cNvCxnSpPr>
+            <p:nvPr/>
+          </p:nvCxnSpPr>
+          <p:spPr>
+            <a:xfrm flipH="1" flipV="1">
+              <a:off x="5327780" y="3526971"/>
+              <a:ext cx="2565918" cy="1946522"/>
+            </a:xfrm>
+            <a:prstGeom prst="bentConnector3">
+              <a:avLst>
+                <a:gd name="adj1" fmla="val -8909"/>
+              </a:avLst>
+            </a:prstGeom>
+            <a:ln w="63500">
+              <a:solidFill>
+                <a:srgbClr val="00B0F0"/>
+              </a:solidFill>
+              <a:tailEnd type="triangle"/>
+            </a:ln>
+          </p:spPr>
+          <p:style>
+            <a:lnRef idx="1">
+              <a:schemeClr val="accent1"/>
+            </a:lnRef>
+            <a:fillRef idx="0">
+              <a:schemeClr val="accent1"/>
+            </a:fillRef>
+            <a:effectRef idx="0">
+              <a:schemeClr val="accent1"/>
+            </a:effectRef>
+            <a:fontRef idx="minor">
+              <a:schemeClr val="tx1"/>
+            </a:fontRef>
+          </p:style>
+        </p:cxnSp>
+        <p:sp>
+          <p:nvSpPr>
+            <p:cNvPr id="33" name="矩形 32"/>
+            <p:cNvSpPr/>
+            <p:nvPr/>
+          </p:nvSpPr>
+          <p:spPr>
+            <a:xfrm>
+              <a:off x="8859785" y="5076942"/>
+              <a:ext cx="1786444" cy="793101"/>
+            </a:xfrm>
+            <a:prstGeom prst="rect">
+              <a:avLst/>
+            </a:prstGeom>
+          </p:spPr>
+          <p:style>
+            <a:lnRef idx="0">
+              <a:schemeClr val="accent4"/>
+            </a:lnRef>
+            <a:fillRef idx="3">
+              <a:schemeClr val="accent4"/>
+            </a:fillRef>
+            <a:effectRef idx="3">
+              <a:schemeClr val="accent4"/>
+            </a:effectRef>
+            <a:fontRef idx="minor">
+              <a:schemeClr val="lt1"/>
+            </a:fontRef>
+          </p:style>
+          <p:txBody>
+            <a:bodyPr rtlCol="0" anchor="ctr"/>
+            <a:lstStyle/>
+            <a:p>
+              <a:pPr algn="ctr"/>
+              <a:r>
+                <a:rPr lang="en-US" altLang="zh-CN" dirty="0" err="1" smtClean="0"/>
+                <a:t>LinqProvider</a:t>
+              </a:r>
+              <a:endParaRPr lang="zh-CN" altLang="en-US" dirty="0"/>
+            </a:p>
+          </p:txBody>
+        </p:sp>
+      </p:grpSp>
+    </p:spTree>
+    <p:extLst>
+      <p:ext uri="{BB962C8B-B14F-4D97-AF65-F5344CB8AC3E}">
+        <p14:creationId xmlns:p14="http://schemas.microsoft.com/office/powerpoint/2010/main" val="4037269792"/>
       </p:ext>
     </p:extLst>
   </p:cSld>

</xml_diff>